<commit_message>
updated slides link, added a string interpolation example
</commit_message>
<xml_diff>
--- a/slides.pptx
+++ b/slides.pptx
@@ -2,7 +2,7 @@
 <file path=ppt/presentation.xml><?xml version="1.0" encoding="utf-8"?>
 <p:presentation xmlns:a="http://schemas.openxmlformats.org/drawingml/2006/main" xmlns:r="http://schemas.openxmlformats.org/officeDocument/2006/relationships" xmlns:mc="http://schemas.openxmlformats.org/markup-compatibility/2006" xmlns:mv="urn:schemas-microsoft-com:mac:vml" xmlns:p="http://schemas.openxmlformats.org/presentationml/2006/main" mc:Ignorable="mv" mc:PreserveAttributes="mv:*" saveSubsetFonts="1" autoCompressPictures="0">
   <p:sldMasterIdLst>
-    <p:sldMasterId r:id="rId1"/>
+    <p:sldMasterId id="2147483648" r:id="rId1"/>
   </p:sldMasterIdLst>
   <p:sldIdLst>
     <p:sldId id="256" r:id="rId2"/>
@@ -567,7 +567,8 @@
           <a:p>
             <a:fld id="{74CDA79C-E541-3D44-8574-2D69161D9C67}" type="datetimeFigureOut">
               <a:rPr lang="en-US" smtClean="0"/>
-              <a:t>3/14/11</a:t>
+              <a:pPr/>
+              <a:t>7/27/11</a:t>
             </a:fld>
             <a:endParaRPr lang="en-US"/>
           </a:p>
@@ -625,6 +626,7 @@
           <a:p>
             <a:fld id="{A8D4A3B0-EADD-B042-B556-EBCB6FF17EA2}" type="slidenum">
               <a:rPr lang="en-US" smtClean="0"/>
+              <a:pPr/>
               <a:t>‹#›</a:t>
             </a:fld>
             <a:endParaRPr lang="en-US"/>
@@ -2056,18 +2058,18 @@
   </p:cSld>
   <p:clrMap bg1="lt1" tx1="dk1" bg2="lt2" tx2="dk2" accent1="accent1" accent2="accent2" accent3="accent3" accent4="accent4" accent5="accent5" accent6="accent6" hlink="hlink" folHlink="folHlink"/>
   <p:sldLayoutIdLst>
-    <p:sldLayoutId r:id="rId1"/>
-    <p:sldLayoutId r:id="rId2"/>
-    <p:sldLayoutId r:id="rId3"/>
-    <p:sldLayoutId r:id="rId4"/>
-    <p:sldLayoutId r:id="rId5"/>
-    <p:sldLayoutId r:id="rId6"/>
-    <p:sldLayoutId r:id="rId7"/>
-    <p:sldLayoutId r:id="rId8"/>
-    <p:sldLayoutId r:id="rId9"/>
-    <p:sldLayoutId r:id="rId10"/>
-    <p:sldLayoutId r:id="rId11"/>
-    <p:sldLayoutId r:id="rId12"/>
+    <p:sldLayoutId id="2147483649" r:id="rId1"/>
+    <p:sldLayoutId id="2147483650" r:id="rId2"/>
+    <p:sldLayoutId id="2147483651" r:id="rId3"/>
+    <p:sldLayoutId id="2147483652" r:id="rId4"/>
+    <p:sldLayoutId id="2147483653" r:id="rId5"/>
+    <p:sldLayoutId id="2147483654" r:id="rId6"/>
+    <p:sldLayoutId id="2147483655" r:id="rId7"/>
+    <p:sldLayoutId id="2147483656" r:id="rId8"/>
+    <p:sldLayoutId id="2147483657" r:id="rId9"/>
+    <p:sldLayoutId id="2147483658" r:id="rId10"/>
+    <p:sldLayoutId id="2147483659" r:id="rId11"/>
+    <p:sldLayoutId id="2147483660" r:id="rId12"/>
   </p:sldLayoutIdLst>
   <p:txStyles>
     <p:titleStyle>
@@ -2815,8 +2817,8 @@
         </p:nvSpPr>
         <p:spPr>
           <a:xfrm>
-            <a:off x="533400" y="3163669"/>
-            <a:ext cx="8209249" cy="1754327"/>
+            <a:off x="384296" y="3440668"/>
+            <a:ext cx="8507457" cy="1200328"/>
           </a:xfrm>
           <a:prstGeom prst="rect">
             <a:avLst/>
@@ -2830,30 +2832,32 @@
           <a:p>
             <a:pPr algn="ctr"/>
             <a:r>
-              <a:rPr lang="en-US" sz="3600" dirty="0" smtClean="0">
+              <a:rPr lang="en-US" sz="2400" dirty="0" smtClean="0">
                 <a:hlinkClick r:id="rId2"/>
               </a:rPr>
               <a:t>http://python.org/about/gettingstarted/</a:t>
             </a:r>
-            <a:endParaRPr lang="en-US" sz="3600" dirty="0" smtClean="0"/>
+            <a:endParaRPr lang="en-US" sz="2400" dirty="0" smtClean="0"/>
           </a:p>
           <a:p>
             <a:pPr algn="ctr"/>
-            <a:endParaRPr lang="en-US" sz="3600" dirty="0" smtClean="0"/>
+            <a:endParaRPr lang="en-US" sz="2400" dirty="0" smtClean="0"/>
           </a:p>
           <a:p>
             <a:pPr algn="ctr"/>
             <a:r>
-              <a:rPr lang="en-US" sz="3600" dirty="0" smtClean="0">
+              <a:rPr lang="en-US" sz="2400" dirty="0" smtClean="0">
                 <a:hlinkClick r:id="rId3"/>
               </a:rPr>
-              <a:t>https://github.com/albertsun/cma_python</a:t>
-            </a:r>
-            <a:endParaRPr lang="en-US" sz="3600" dirty="0" smtClean="0"/>
-          </a:p>
-          <a:p>
-            <a:pPr algn="ctr"/>
-            <a:endParaRPr lang="en-US" sz="3600" dirty="0"/>
+              <a:t>https://github.com/albertsun/Intro-Data-Journalism-With-Python</a:t>
+            </a:r>
+            <a:r>
+              <a:rPr lang="en-US" sz="2400" dirty="0" smtClean="0">
+                <a:hlinkClick r:id="rId3"/>
+              </a:rPr>
+              <a:t>/</a:t>
+            </a:r>
+            <a:endParaRPr lang="en-US" sz="2400" dirty="0" smtClean="0"/>
           </a:p>
         </p:txBody>
       </p:sp>

</xml_diff>